<commit_message>
add tranfer learning with bert + ATT slides
</commit_message>
<xml_diff>
--- a/03_data_collection/99_Project_Kayak/01_kayak_project.pptx
+++ b/03_data_collection/99_Project_Kayak/01_kayak_project.pptx
@@ -134,7 +134,7 @@
   <pc:docChgLst>
     <pc:chgData name="Philippe Baucour" userId="5102170ae7533958" providerId="LiveId" clId="{1527D352-431F-46B2-B7FF-4AE38ADEBEBC}"/>
     <pc:docChg chg="undo custSel addSld modSld sldOrd">
-      <pc:chgData name="Philippe Baucour" userId="5102170ae7533958" providerId="LiveId" clId="{1527D352-431F-46B2-B7FF-4AE38ADEBEBC}" dt="2024-08-26T09:19:24.733" v="132" actId="20577"/>
+      <pc:chgData name="Philippe Baucour" userId="5102170ae7533958" providerId="LiveId" clId="{1527D352-431F-46B2-B7FF-4AE38ADEBEBC}" dt="2024-09-02T16:32:06.981" v="301" actId="20577"/>
       <pc:docMkLst>
         <pc:docMk/>
       </pc:docMkLst>
@@ -168,8 +168,8 @@
           </ac:spMkLst>
         </pc:spChg>
       </pc:sldChg>
-      <pc:sldChg chg="addSp modSp mod">
-        <pc:chgData name="Philippe Baucour" userId="5102170ae7533958" providerId="LiveId" clId="{1527D352-431F-46B2-B7FF-4AE38ADEBEBC}" dt="2024-08-20T13:32:14.809" v="75" actId="1036"/>
+      <pc:sldChg chg="addSp modSp mod modNotesTx">
+        <pc:chgData name="Philippe Baucour" userId="5102170ae7533958" providerId="LiveId" clId="{1527D352-431F-46B2-B7FF-4AE38ADEBEBC}" dt="2024-09-02T16:32:06.981" v="301" actId="20577"/>
         <pc:sldMkLst>
           <pc:docMk/>
           <pc:sldMk cId="1044313820" sldId="260"/>
@@ -293,7 +293,7 @@
           <a:p>
             <a:fld id="{FD1752CD-A7D2-4825-BC26-9DAEFBD0A5FF}" type="datetimeFigureOut">
               <a:rPr lang="fr-FR" smtClean="0"/>
-              <a:t>26/08/2024</a:t>
+              <a:t>02/09/2024</a:t>
             </a:fld>
             <a:endParaRPr lang="fr-FR"/>
           </a:p>
@@ -1310,11 +1310,11 @@
             </a:pPr>
             <a:r>
               <a:rPr lang="fr-FR" dirty="0"/>
-              <a:t>bien isolé chaque tâche (liste des </a:t>
+              <a:t>bien isoler les responsabilités de chaque tâche (liste des </a:t>
             </a:r>
             <a:r>
               <a:rPr lang="fr-FR" dirty="0" err="1"/>
-              <a:t>urles</a:t>
+              <a:t>urls</a:t>
             </a:r>
             <a:r>
               <a:rPr lang="fr-FR" dirty="0"/>
@@ -1353,6 +1353,28 @@
             <a:r>
               <a:rPr lang="fr-FR" dirty="0"/>
               <a:t> et la maintenance</a:t>
+            </a:r>
+          </a:p>
+          <a:p>
+            <a:pPr marL="228600" indent="-228600">
+              <a:buFont typeface="+mj-lt"/>
+              <a:buAutoNum type="arabicPeriod"/>
+            </a:pPr>
+            <a:r>
+              <a:rPr lang="fr-FR"/>
+              <a:t>on ne touchera </a:t>
+            </a:r>
+            <a:r>
+              <a:rPr lang="fr-FR" dirty="0"/>
+              <a:t>pas au scraper d'attribut si la page qui fait la liste des </a:t>
+            </a:r>
+            <a:r>
+              <a:rPr lang="fr-FR" dirty="0" err="1"/>
+              <a:t>hotels</a:t>
+            </a:r>
+            <a:r>
+              <a:rPr lang="fr-FR" dirty="0"/>
+              <a:t> est la seule à changer</a:t>
             </a:r>
           </a:p>
           <a:p>
@@ -1971,7 +1993,7 @@
           <a:p>
             <a:fld id="{7ECB9D5A-E5E4-41FE-AF39-634902D6D5D2}" type="datetimeFigureOut">
               <a:rPr lang="fr-FR" smtClean="0"/>
-              <a:t>26/08/2024</a:t>
+              <a:t>02/09/2024</a:t>
             </a:fld>
             <a:endParaRPr lang="fr-FR"/>
           </a:p>
@@ -2169,7 +2191,7 @@
           <a:p>
             <a:fld id="{7ECB9D5A-E5E4-41FE-AF39-634902D6D5D2}" type="datetimeFigureOut">
               <a:rPr lang="fr-FR" smtClean="0"/>
-              <a:t>26/08/2024</a:t>
+              <a:t>02/09/2024</a:t>
             </a:fld>
             <a:endParaRPr lang="fr-FR"/>
           </a:p>
@@ -2377,7 +2399,7 @@
           <a:p>
             <a:fld id="{7ECB9D5A-E5E4-41FE-AF39-634902D6D5D2}" type="datetimeFigureOut">
               <a:rPr lang="fr-FR" smtClean="0"/>
-              <a:t>26/08/2024</a:t>
+              <a:t>02/09/2024</a:t>
             </a:fld>
             <a:endParaRPr lang="fr-FR"/>
           </a:p>
@@ -2575,7 +2597,7 @@
           <a:p>
             <a:fld id="{7ECB9D5A-E5E4-41FE-AF39-634902D6D5D2}" type="datetimeFigureOut">
               <a:rPr lang="fr-FR" smtClean="0"/>
-              <a:t>26/08/2024</a:t>
+              <a:t>02/09/2024</a:t>
             </a:fld>
             <a:endParaRPr lang="fr-FR"/>
           </a:p>
@@ -2850,7 +2872,7 @@
           <a:p>
             <a:fld id="{7ECB9D5A-E5E4-41FE-AF39-634902D6D5D2}" type="datetimeFigureOut">
               <a:rPr lang="fr-FR" smtClean="0"/>
-              <a:t>26/08/2024</a:t>
+              <a:t>02/09/2024</a:t>
             </a:fld>
             <a:endParaRPr lang="fr-FR"/>
           </a:p>
@@ -3115,7 +3137,7 @@
           <a:p>
             <a:fld id="{7ECB9D5A-E5E4-41FE-AF39-634902D6D5D2}" type="datetimeFigureOut">
               <a:rPr lang="fr-FR" smtClean="0"/>
-              <a:t>26/08/2024</a:t>
+              <a:t>02/09/2024</a:t>
             </a:fld>
             <a:endParaRPr lang="fr-FR"/>
           </a:p>
@@ -3527,7 +3549,7 @@
           <a:p>
             <a:fld id="{7ECB9D5A-E5E4-41FE-AF39-634902D6D5D2}" type="datetimeFigureOut">
               <a:rPr lang="fr-FR" smtClean="0"/>
-              <a:t>26/08/2024</a:t>
+              <a:t>02/09/2024</a:t>
             </a:fld>
             <a:endParaRPr lang="fr-FR"/>
           </a:p>
@@ -3668,7 +3690,7 @@
           <a:p>
             <a:fld id="{7ECB9D5A-E5E4-41FE-AF39-634902D6D5D2}" type="datetimeFigureOut">
               <a:rPr lang="fr-FR" smtClean="0"/>
-              <a:t>26/08/2024</a:t>
+              <a:t>02/09/2024</a:t>
             </a:fld>
             <a:endParaRPr lang="fr-FR"/>
           </a:p>
@@ -3781,7 +3803,7 @@
           <a:p>
             <a:fld id="{7ECB9D5A-E5E4-41FE-AF39-634902D6D5D2}" type="datetimeFigureOut">
               <a:rPr lang="fr-FR" smtClean="0"/>
-              <a:t>26/08/2024</a:t>
+              <a:t>02/09/2024</a:t>
             </a:fld>
             <a:endParaRPr lang="fr-FR"/>
           </a:p>
@@ -4092,7 +4114,7 @@
           <a:p>
             <a:fld id="{7ECB9D5A-E5E4-41FE-AF39-634902D6D5D2}" type="datetimeFigureOut">
               <a:rPr lang="fr-FR" smtClean="0"/>
-              <a:t>26/08/2024</a:t>
+              <a:t>02/09/2024</a:t>
             </a:fld>
             <a:endParaRPr lang="fr-FR"/>
           </a:p>
@@ -4383,7 +4405,7 @@
           <a:p>
             <a:fld id="{7ECB9D5A-E5E4-41FE-AF39-634902D6D5D2}" type="datetimeFigureOut">
               <a:rPr lang="fr-FR" smtClean="0"/>
-              <a:t>26/08/2024</a:t>
+              <a:t>02/09/2024</a:t>
             </a:fld>
             <a:endParaRPr lang="fr-FR"/>
           </a:p>
@@ -4624,7 +4646,7 @@
           <a:p>
             <a:fld id="{7ECB9D5A-E5E4-41FE-AF39-634902D6D5D2}" type="datetimeFigureOut">
               <a:rPr lang="fr-FR" smtClean="0"/>
-              <a:t>26/08/2024</a:t>
+              <a:t>02/09/2024</a:t>
             </a:fld>
             <a:endParaRPr lang="fr-FR"/>
           </a:p>

</xml_diff>